<commit_message>
updates and added documents
</commit_message>
<xml_diff>
--- a/presentations/WEST_IC_week37.pptx
+++ b/presentations/WEST_IC_week37.pptx
@@ -7,10 +7,10 @@
     <p:sldMasterId id="2147483724" r:id="rId6"/>
   </p:sldMasterIdLst>
   <p:notesMasterIdLst>
-    <p:notesMasterId r:id="rId16"/>
+    <p:notesMasterId r:id="rId18"/>
   </p:notesMasterIdLst>
   <p:handoutMasterIdLst>
-    <p:handoutMasterId r:id="rId17"/>
+    <p:handoutMasterId r:id="rId19"/>
   </p:handoutMasterIdLst>
   <p:sldIdLst>
     <p:sldId id="273" r:id="rId7"/>
@@ -22,6 +22,8 @@
     <p:sldId id="282" r:id="rId13"/>
     <p:sldId id="286" r:id="rId14"/>
     <p:sldId id="287" r:id="rId15"/>
+    <p:sldId id="288" r:id="rId16"/>
+    <p:sldId id="289" r:id="rId17"/>
   </p:sldIdLst>
   <p:sldSz cx="9144000" cy="6858000" type="screen4x3"/>
   <p:notesSz cx="7099300" cy="10234613"/>
@@ -122,7 +124,7 @@
   </p:defaultTextStyle>
   <p:extLst>
     <p:ext uri="{EFAFB233-063F-42B5-8137-9DF3F51BA10A}">
-      <p15:sldGuideLst xmlns:p15="http://schemas.microsoft.com/office/powerpoint/2012/main" xmlns="">
+      <p15:sldGuideLst xmlns="" xmlns:p15="http://schemas.microsoft.com/office/powerpoint/2012/main">
         <p15:guide id="1" orient="horz" pos="1620" userDrawn="1">
           <p15:clr>
             <a:srgbClr val="A4A3A4"/>
@@ -196,7 +198,7 @@
       </p15:sldGuideLst>
     </p:ext>
     <p:ext uri="{2D200454-40CA-4A62-9FC3-DE9A4176ACB9}">
-      <p15:notesGuideLst xmlns:p15="http://schemas.microsoft.com/office/powerpoint/2012/main" xmlns="">
+      <p15:notesGuideLst xmlns="" xmlns:p15="http://schemas.microsoft.com/office/powerpoint/2012/main">
         <p15:guide id="1" orient="horz" pos="3224" userDrawn="1">
           <p15:clr>
             <a:srgbClr val="A4A3A4"/>
@@ -295,7 +297,7 @@
           <a:p>
             <a:fld id="{F481E118-1CEA-43E8-BD51-A8A2CBD62889}" type="datetimeFigureOut">
               <a:rPr lang="fr-FR" smtClean="0"/>
-              <a:t>11/09/2019</a:t>
+              <a:t>13/09/2019</a:t>
             </a:fld>
             <a:endParaRPr lang="fr-FR"/>
           </a:p>
@@ -460,7 +462,7 @@
           <a:p>
             <a:fld id="{F0389419-4E28-4B58-9AA2-383238311FDA}" type="datetimeFigureOut">
               <a:rPr lang="fr-FR" smtClean="0"/>
-              <a:t>11/09/2019</a:t>
+              <a:t>13/09/2019</a:t>
             </a:fld>
             <a:endParaRPr lang="fr-FR"/>
           </a:p>
@@ -1049,7 +1051,7 @@
             <a:pPr lvl="0"/>
             <a:fld id="{ED1C4103-FF01-4613-BB77-A54429AC18D2}" type="datetime4">
               <a:rPr lang="fr-FR" noProof="0" smtClean="0"/>
-              <a:t>11 septembre 2019</a:t>
+              <a:t>13 septembre 2019</a:t>
             </a:fld>
             <a:endParaRPr lang="fr-FR" noProof="0" dirty="0"/>
           </a:p>
@@ -1130,7 +1132,7 @@
           <p:cNvPr id="2" name="Titre 1">
             <a:extLst>
               <a:ext uri="{FF2B5EF4-FFF2-40B4-BE49-F238E27FC236}">
-                <a16:creationId xmlns:a16="http://schemas.microsoft.com/office/drawing/2014/main" xmlns="" id="{9CDDA024-CC5C-49D4-9EDE-B13C9CE4F869}"/>
+                <a16:creationId xmlns="" xmlns:a16="http://schemas.microsoft.com/office/drawing/2014/main" id="{9CDDA024-CC5C-49D4-9EDE-B13C9CE4F869}"/>
               </a:ext>
             </a:extLst>
           </p:cNvPr>
@@ -1159,7 +1161,7 @@
           <p:cNvPr id="3" name="Espace réservé du numéro de diapositive 2">
             <a:extLst>
               <a:ext uri="{FF2B5EF4-FFF2-40B4-BE49-F238E27FC236}">
-                <a16:creationId xmlns:a16="http://schemas.microsoft.com/office/drawing/2014/main" xmlns="" id="{76952101-6F0D-4470-B900-D7C009A8362C}"/>
+                <a16:creationId xmlns="" xmlns:a16="http://schemas.microsoft.com/office/drawing/2014/main" id="{76952101-6F0D-4470-B900-D7C009A8362C}"/>
               </a:ext>
             </a:extLst>
           </p:cNvPr>
@@ -1203,7 +1205,7 @@
           <p:cNvPr id="5" name="Espace réservé pour une image  4">
             <a:extLst>
               <a:ext uri="{FF2B5EF4-FFF2-40B4-BE49-F238E27FC236}">
-                <a16:creationId xmlns:a16="http://schemas.microsoft.com/office/drawing/2014/main" xmlns="" id="{60769C5C-EDFB-44C6-A754-7FD9C1B5A1AC}"/>
+                <a16:creationId xmlns="" xmlns:a16="http://schemas.microsoft.com/office/drawing/2014/main" id="{60769C5C-EDFB-44C6-A754-7FD9C1B5A1AC}"/>
               </a:ext>
             </a:extLst>
           </p:cNvPr>
@@ -1237,7 +1239,7 @@
           <p:cNvPr id="6" name="Espace réservé pour une image  4">
             <a:extLst>
               <a:ext uri="{FF2B5EF4-FFF2-40B4-BE49-F238E27FC236}">
-                <a16:creationId xmlns:a16="http://schemas.microsoft.com/office/drawing/2014/main" xmlns="" id="{CE83B8F1-3CFD-4C6F-B77B-684EE09D6FEC}"/>
+                <a16:creationId xmlns="" xmlns:a16="http://schemas.microsoft.com/office/drawing/2014/main" id="{CE83B8F1-3CFD-4C6F-B77B-684EE09D6FEC}"/>
               </a:ext>
             </a:extLst>
           </p:cNvPr>
@@ -1271,7 +1273,7 @@
           <p:cNvPr id="8" name="Espace réservé du texte 7">
             <a:extLst>
               <a:ext uri="{FF2B5EF4-FFF2-40B4-BE49-F238E27FC236}">
-                <a16:creationId xmlns:a16="http://schemas.microsoft.com/office/drawing/2014/main" xmlns="" id="{81F07BDA-5AB0-410C-A329-8C06350E1EDE}"/>
+                <a16:creationId xmlns="" xmlns:a16="http://schemas.microsoft.com/office/drawing/2014/main" id="{81F07BDA-5AB0-410C-A329-8C06350E1EDE}"/>
               </a:ext>
             </a:extLst>
           </p:cNvPr>
@@ -1323,7 +1325,7 @@
           <p:cNvPr id="10" name="Connecteur droit 9">
             <a:extLst>
               <a:ext uri="{FF2B5EF4-FFF2-40B4-BE49-F238E27FC236}">
-                <a16:creationId xmlns:a16="http://schemas.microsoft.com/office/drawing/2014/main" xmlns="" id="{F95E4514-E62C-42B5-BE1E-5F1CD3D2A789}"/>
+                <a16:creationId xmlns="" xmlns:a16="http://schemas.microsoft.com/office/drawing/2014/main" id="{F95E4514-E62C-42B5-BE1E-5F1CD3D2A789}"/>
               </a:ext>
             </a:extLst>
           </p:cNvPr>
@@ -1364,7 +1366,7 @@
           <p:cNvPr id="11" name="Espace réservé du texte 7">
             <a:extLst>
               <a:ext uri="{FF2B5EF4-FFF2-40B4-BE49-F238E27FC236}">
-                <a16:creationId xmlns:a16="http://schemas.microsoft.com/office/drawing/2014/main" xmlns="" id="{5C946E34-2083-434D-8404-8F5AEE71F02C}"/>
+                <a16:creationId xmlns="" xmlns:a16="http://schemas.microsoft.com/office/drawing/2014/main" id="{5C946E34-2083-434D-8404-8F5AEE71F02C}"/>
               </a:ext>
             </a:extLst>
           </p:cNvPr>
@@ -1416,7 +1418,7 @@
           <p:cNvPr id="12" name="Connecteur droit 11">
             <a:extLst>
               <a:ext uri="{FF2B5EF4-FFF2-40B4-BE49-F238E27FC236}">
-                <a16:creationId xmlns:a16="http://schemas.microsoft.com/office/drawing/2014/main" xmlns="" id="{6653795C-036F-4780-863C-5F5B75D45AC9}"/>
+                <a16:creationId xmlns="" xmlns:a16="http://schemas.microsoft.com/office/drawing/2014/main" id="{6653795C-036F-4780-863C-5F5B75D45AC9}"/>
               </a:ext>
             </a:extLst>
           </p:cNvPr>
@@ -1457,7 +1459,7 @@
           <p:cNvPr id="13" name="Espace réservé pour une image  4">
             <a:extLst>
               <a:ext uri="{FF2B5EF4-FFF2-40B4-BE49-F238E27FC236}">
-                <a16:creationId xmlns:a16="http://schemas.microsoft.com/office/drawing/2014/main" xmlns="" id="{6076C443-2E06-4281-8B05-53A67256EEBA}"/>
+                <a16:creationId xmlns="" xmlns:a16="http://schemas.microsoft.com/office/drawing/2014/main" id="{6076C443-2E06-4281-8B05-53A67256EEBA}"/>
               </a:ext>
             </a:extLst>
           </p:cNvPr>
@@ -1491,7 +1493,7 @@
           <p:cNvPr id="14" name="Espace réservé pour une image  4">
             <a:extLst>
               <a:ext uri="{FF2B5EF4-FFF2-40B4-BE49-F238E27FC236}">
-                <a16:creationId xmlns:a16="http://schemas.microsoft.com/office/drawing/2014/main" xmlns="" id="{AAFC24E1-75A5-4390-A26C-B3DE9FF20EE3}"/>
+                <a16:creationId xmlns="" xmlns:a16="http://schemas.microsoft.com/office/drawing/2014/main" id="{AAFC24E1-75A5-4390-A26C-B3DE9FF20EE3}"/>
               </a:ext>
             </a:extLst>
           </p:cNvPr>
@@ -1525,7 +1527,7 @@
           <p:cNvPr id="15" name="Espace réservé du texte 7">
             <a:extLst>
               <a:ext uri="{FF2B5EF4-FFF2-40B4-BE49-F238E27FC236}">
-                <a16:creationId xmlns:a16="http://schemas.microsoft.com/office/drawing/2014/main" xmlns="" id="{67AD350B-6F89-4863-9328-41F1D93BBC1F}"/>
+                <a16:creationId xmlns="" xmlns:a16="http://schemas.microsoft.com/office/drawing/2014/main" id="{67AD350B-6F89-4863-9328-41F1D93BBC1F}"/>
               </a:ext>
             </a:extLst>
           </p:cNvPr>
@@ -1577,7 +1579,7 @@
           <p:cNvPr id="16" name="Connecteur droit 15">
             <a:extLst>
               <a:ext uri="{FF2B5EF4-FFF2-40B4-BE49-F238E27FC236}">
-                <a16:creationId xmlns:a16="http://schemas.microsoft.com/office/drawing/2014/main" xmlns="" id="{7B1C8393-42C9-4E5B-B22A-7A1C80B3392B}"/>
+                <a16:creationId xmlns="" xmlns:a16="http://schemas.microsoft.com/office/drawing/2014/main" id="{7B1C8393-42C9-4E5B-B22A-7A1C80B3392B}"/>
               </a:ext>
             </a:extLst>
           </p:cNvPr>
@@ -1618,7 +1620,7 @@
           <p:cNvPr id="17" name="Espace réservé du texte 7">
             <a:extLst>
               <a:ext uri="{FF2B5EF4-FFF2-40B4-BE49-F238E27FC236}">
-                <a16:creationId xmlns:a16="http://schemas.microsoft.com/office/drawing/2014/main" xmlns="" id="{EADC8B10-F914-44B6-855C-77AEF500D416}"/>
+                <a16:creationId xmlns="" xmlns:a16="http://schemas.microsoft.com/office/drawing/2014/main" id="{EADC8B10-F914-44B6-855C-77AEF500D416}"/>
               </a:ext>
             </a:extLst>
           </p:cNvPr>
@@ -1670,7 +1672,7 @@
           <p:cNvPr id="18" name="Connecteur droit 17">
             <a:extLst>
               <a:ext uri="{FF2B5EF4-FFF2-40B4-BE49-F238E27FC236}">
-                <a16:creationId xmlns:a16="http://schemas.microsoft.com/office/drawing/2014/main" xmlns="" id="{6674119E-EE06-45F8-B404-7D969C8F47C0}"/>
+                <a16:creationId xmlns="" xmlns:a16="http://schemas.microsoft.com/office/drawing/2014/main" id="{6674119E-EE06-45F8-B404-7D969C8F47C0}"/>
               </a:ext>
             </a:extLst>
           </p:cNvPr>
@@ -1711,7 +1713,7 @@
           <p:cNvPr id="19" name="Espace réservé pour une image  4">
             <a:extLst>
               <a:ext uri="{FF2B5EF4-FFF2-40B4-BE49-F238E27FC236}">
-                <a16:creationId xmlns:a16="http://schemas.microsoft.com/office/drawing/2014/main" xmlns="" id="{2E8B88C5-9DD3-4342-8110-493B6A4046ED}"/>
+                <a16:creationId xmlns="" xmlns:a16="http://schemas.microsoft.com/office/drawing/2014/main" id="{2E8B88C5-9DD3-4342-8110-493B6A4046ED}"/>
               </a:ext>
             </a:extLst>
           </p:cNvPr>
@@ -1745,7 +1747,7 @@
           <p:cNvPr id="20" name="Espace réservé pour une image  4">
             <a:extLst>
               <a:ext uri="{FF2B5EF4-FFF2-40B4-BE49-F238E27FC236}">
-                <a16:creationId xmlns:a16="http://schemas.microsoft.com/office/drawing/2014/main" xmlns="" id="{11DFD99F-CCC2-490B-9103-83A0C7B5BF9E}"/>
+                <a16:creationId xmlns="" xmlns:a16="http://schemas.microsoft.com/office/drawing/2014/main" id="{11DFD99F-CCC2-490B-9103-83A0C7B5BF9E}"/>
               </a:ext>
             </a:extLst>
           </p:cNvPr>
@@ -1779,7 +1781,7 @@
           <p:cNvPr id="21" name="Espace réservé du texte 7">
             <a:extLst>
               <a:ext uri="{FF2B5EF4-FFF2-40B4-BE49-F238E27FC236}">
-                <a16:creationId xmlns:a16="http://schemas.microsoft.com/office/drawing/2014/main" xmlns="" id="{105DF51F-34C2-49EC-92D0-D81C49BE61DF}"/>
+                <a16:creationId xmlns="" xmlns:a16="http://schemas.microsoft.com/office/drawing/2014/main" id="{105DF51F-34C2-49EC-92D0-D81C49BE61DF}"/>
               </a:ext>
             </a:extLst>
           </p:cNvPr>
@@ -1831,7 +1833,7 @@
           <p:cNvPr id="22" name="Connecteur droit 21">
             <a:extLst>
               <a:ext uri="{FF2B5EF4-FFF2-40B4-BE49-F238E27FC236}">
-                <a16:creationId xmlns:a16="http://schemas.microsoft.com/office/drawing/2014/main" xmlns="" id="{A75A8DBD-F5B7-405E-B653-6D5F7E42EB8D}"/>
+                <a16:creationId xmlns="" xmlns:a16="http://schemas.microsoft.com/office/drawing/2014/main" id="{A75A8DBD-F5B7-405E-B653-6D5F7E42EB8D}"/>
               </a:ext>
             </a:extLst>
           </p:cNvPr>
@@ -1872,7 +1874,7 @@
           <p:cNvPr id="23" name="Espace réservé du texte 7">
             <a:extLst>
               <a:ext uri="{FF2B5EF4-FFF2-40B4-BE49-F238E27FC236}">
-                <a16:creationId xmlns:a16="http://schemas.microsoft.com/office/drawing/2014/main" xmlns="" id="{A402FF8C-DB59-4608-B517-7FD56431411A}"/>
+                <a16:creationId xmlns="" xmlns:a16="http://schemas.microsoft.com/office/drawing/2014/main" id="{A402FF8C-DB59-4608-B517-7FD56431411A}"/>
               </a:ext>
             </a:extLst>
           </p:cNvPr>
@@ -1924,7 +1926,7 @@
           <p:cNvPr id="24" name="Connecteur droit 23">
             <a:extLst>
               <a:ext uri="{FF2B5EF4-FFF2-40B4-BE49-F238E27FC236}">
-                <a16:creationId xmlns:a16="http://schemas.microsoft.com/office/drawing/2014/main" xmlns="" id="{7D552D8A-671C-4599-8FC0-D56624B966E2}"/>
+                <a16:creationId xmlns="" xmlns:a16="http://schemas.microsoft.com/office/drawing/2014/main" id="{7D552D8A-671C-4599-8FC0-D56624B966E2}"/>
               </a:ext>
             </a:extLst>
           </p:cNvPr>
@@ -1965,7 +1967,7 @@
           <p:cNvPr id="25" name="Espace réservé pour une image  4">
             <a:extLst>
               <a:ext uri="{FF2B5EF4-FFF2-40B4-BE49-F238E27FC236}">
-                <a16:creationId xmlns:a16="http://schemas.microsoft.com/office/drawing/2014/main" xmlns="" id="{979E6621-7EBD-4E8A-9D3F-98667422C622}"/>
+                <a16:creationId xmlns="" xmlns:a16="http://schemas.microsoft.com/office/drawing/2014/main" id="{979E6621-7EBD-4E8A-9D3F-98667422C622}"/>
               </a:ext>
             </a:extLst>
           </p:cNvPr>
@@ -1999,7 +2001,7 @@
           <p:cNvPr id="26" name="Espace réservé pour une image  4">
             <a:extLst>
               <a:ext uri="{FF2B5EF4-FFF2-40B4-BE49-F238E27FC236}">
-                <a16:creationId xmlns:a16="http://schemas.microsoft.com/office/drawing/2014/main" xmlns="" id="{4EB9FABD-311A-46B5-803C-4468714878B6}"/>
+                <a16:creationId xmlns="" xmlns:a16="http://schemas.microsoft.com/office/drawing/2014/main" id="{4EB9FABD-311A-46B5-803C-4468714878B6}"/>
               </a:ext>
             </a:extLst>
           </p:cNvPr>
@@ -2033,7 +2035,7 @@
           <p:cNvPr id="27" name="Espace réservé du texte 7">
             <a:extLst>
               <a:ext uri="{FF2B5EF4-FFF2-40B4-BE49-F238E27FC236}">
-                <a16:creationId xmlns:a16="http://schemas.microsoft.com/office/drawing/2014/main" xmlns="" id="{B039882E-C7D2-4A10-8D17-525FEF966617}"/>
+                <a16:creationId xmlns="" xmlns:a16="http://schemas.microsoft.com/office/drawing/2014/main" id="{B039882E-C7D2-4A10-8D17-525FEF966617}"/>
               </a:ext>
             </a:extLst>
           </p:cNvPr>
@@ -2085,7 +2087,7 @@
           <p:cNvPr id="28" name="Connecteur droit 27">
             <a:extLst>
               <a:ext uri="{FF2B5EF4-FFF2-40B4-BE49-F238E27FC236}">
-                <a16:creationId xmlns:a16="http://schemas.microsoft.com/office/drawing/2014/main" xmlns="" id="{40312D7E-F5FE-4ADB-8526-4D9ED88C5C15}"/>
+                <a16:creationId xmlns="" xmlns:a16="http://schemas.microsoft.com/office/drawing/2014/main" id="{40312D7E-F5FE-4ADB-8526-4D9ED88C5C15}"/>
               </a:ext>
             </a:extLst>
           </p:cNvPr>
@@ -2126,7 +2128,7 @@
           <p:cNvPr id="29" name="Espace réservé du texte 7">
             <a:extLst>
               <a:ext uri="{FF2B5EF4-FFF2-40B4-BE49-F238E27FC236}">
-                <a16:creationId xmlns:a16="http://schemas.microsoft.com/office/drawing/2014/main" xmlns="" id="{6AD72B51-7D15-4502-B762-932C85FC8940}"/>
+                <a16:creationId xmlns="" xmlns:a16="http://schemas.microsoft.com/office/drawing/2014/main" id="{6AD72B51-7D15-4502-B762-932C85FC8940}"/>
               </a:ext>
             </a:extLst>
           </p:cNvPr>
@@ -2178,7 +2180,7 @@
           <p:cNvPr id="30" name="Connecteur droit 29">
             <a:extLst>
               <a:ext uri="{FF2B5EF4-FFF2-40B4-BE49-F238E27FC236}">
-                <a16:creationId xmlns:a16="http://schemas.microsoft.com/office/drawing/2014/main" xmlns="" id="{13D9F259-C0D9-40E4-B155-CD1D47C48F43}"/>
+                <a16:creationId xmlns="" xmlns:a16="http://schemas.microsoft.com/office/drawing/2014/main" id="{13D9F259-C0D9-40E4-B155-CD1D47C48F43}"/>
               </a:ext>
             </a:extLst>
           </p:cNvPr>
@@ -3300,7 +3302,7 @@
             <a:pPr lvl="0"/>
             <a:fld id="{B5559CBA-976B-4265-9B41-694881203DBF}" type="datetime4">
               <a:rPr lang="fr-FR" noProof="0" smtClean="0"/>
-              <a:t>11 septembre 2019</a:t>
+              <a:t>13 septembre 2019</a:t>
             </a:fld>
             <a:endParaRPr lang="fr-FR" noProof="0" dirty="0"/>
           </a:p>
@@ -3980,7 +3982,7 @@
           <p:cNvPr id="2" name="Titre 1">
             <a:extLst>
               <a:ext uri="{FF2B5EF4-FFF2-40B4-BE49-F238E27FC236}">
-                <a16:creationId xmlns:a16="http://schemas.microsoft.com/office/drawing/2014/main" xmlns="" id="{9BDD946C-1F13-4F67-B8D1-64EF5CF71ABB}"/>
+                <a16:creationId xmlns="" xmlns:a16="http://schemas.microsoft.com/office/drawing/2014/main" id="{9BDD946C-1F13-4F67-B8D1-64EF5CF71ABB}"/>
               </a:ext>
             </a:extLst>
           </p:cNvPr>
@@ -4008,7 +4010,7 @@
           <p:cNvPr id="3" name="Espace réservé du numéro de diapositive 2">
             <a:extLst>
               <a:ext uri="{FF2B5EF4-FFF2-40B4-BE49-F238E27FC236}">
-                <a16:creationId xmlns:a16="http://schemas.microsoft.com/office/drawing/2014/main" xmlns="" id="{DC37902D-B358-44BD-9A3B-CD8E2882EA2D}"/>
+                <a16:creationId xmlns="" xmlns:a16="http://schemas.microsoft.com/office/drawing/2014/main" id="{DC37902D-B358-44BD-9A3B-CD8E2882EA2D}"/>
               </a:ext>
             </a:extLst>
           </p:cNvPr>
@@ -4052,7 +4054,7 @@
           <p:cNvPr id="4" name="Image 3">
             <a:extLst>
               <a:ext uri="{FF2B5EF4-FFF2-40B4-BE49-F238E27FC236}">
-                <a16:creationId xmlns:a16="http://schemas.microsoft.com/office/drawing/2014/main" xmlns="" id="{187ADA7C-03B8-49D0-A935-DE3625BD6FA7}"/>
+                <a16:creationId xmlns="" xmlns:a16="http://schemas.microsoft.com/office/drawing/2014/main" id="{187ADA7C-03B8-49D0-A935-DE3625BD6FA7}"/>
               </a:ext>
             </a:extLst>
           </p:cNvPr>
@@ -4088,7 +4090,7 @@
           <p:cNvPr id="15" name="Titre 4">
             <a:extLst>
               <a:ext uri="{FF2B5EF4-FFF2-40B4-BE49-F238E27FC236}">
-                <a16:creationId xmlns:a16="http://schemas.microsoft.com/office/drawing/2014/main" xmlns="" id="{72E9C4E7-2BF2-4AB8-9707-825FA5757113}"/>
+                <a16:creationId xmlns="" xmlns:a16="http://schemas.microsoft.com/office/drawing/2014/main" id="{72E9C4E7-2BF2-4AB8-9707-825FA5757113}"/>
               </a:ext>
             </a:extLst>
           </p:cNvPr>
@@ -4144,7 +4146,7 @@
           <p:cNvPr id="19" name="Espace réservé du contenu 18">
             <a:extLst>
               <a:ext uri="{FF2B5EF4-FFF2-40B4-BE49-F238E27FC236}">
-                <a16:creationId xmlns:a16="http://schemas.microsoft.com/office/drawing/2014/main" xmlns="" id="{E6D00721-9CE1-4CF1-AD6A-47E2B8CCCC48}"/>
+                <a16:creationId xmlns="" xmlns:a16="http://schemas.microsoft.com/office/drawing/2014/main" id="{E6D00721-9CE1-4CF1-AD6A-47E2B8CCCC48}"/>
               </a:ext>
             </a:extLst>
           </p:cNvPr>
@@ -4840,7 +4842,7 @@
             <a:pPr lvl="0"/>
             <a:fld id="{B5559CBA-976B-4265-9B41-694881203DBF}" type="datetime4">
               <a:rPr lang="fr-FR" noProof="0" smtClean="0"/>
-              <a:t>11 septembre 2019</a:t>
+              <a:t>13 septembre 2019</a:t>
             </a:fld>
             <a:endParaRPr lang="fr-FR" noProof="0" dirty="0"/>
           </a:p>
@@ -5577,7 +5579,7 @@
             <a:pPr lvl="0"/>
             <a:fld id="{B5559CBA-976B-4265-9B41-694881203DBF}" type="datetime4">
               <a:rPr lang="fr-FR" noProof="0" smtClean="0"/>
-              <a:t>11 septembre 2019</a:t>
+              <a:t>13 septembre 2019</a:t>
             </a:fld>
             <a:endParaRPr lang="fr-FR" noProof="0" dirty="0"/>
           </a:p>
@@ -5958,7 +5960,7 @@
           <p:cNvPr id="2" name="Titre 1">
             <a:extLst>
               <a:ext uri="{FF2B5EF4-FFF2-40B4-BE49-F238E27FC236}">
-                <a16:creationId xmlns:a16="http://schemas.microsoft.com/office/drawing/2014/main" xmlns="" id="{9BDD946C-1F13-4F67-B8D1-64EF5CF71ABB}"/>
+                <a16:creationId xmlns="" xmlns:a16="http://schemas.microsoft.com/office/drawing/2014/main" id="{9BDD946C-1F13-4F67-B8D1-64EF5CF71ABB}"/>
               </a:ext>
             </a:extLst>
           </p:cNvPr>
@@ -5986,7 +5988,7 @@
           <p:cNvPr id="3" name="Espace réservé du numéro de diapositive 2">
             <a:extLst>
               <a:ext uri="{FF2B5EF4-FFF2-40B4-BE49-F238E27FC236}">
-                <a16:creationId xmlns:a16="http://schemas.microsoft.com/office/drawing/2014/main" xmlns="" id="{DC37902D-B358-44BD-9A3B-CD8E2882EA2D}"/>
+                <a16:creationId xmlns="" xmlns:a16="http://schemas.microsoft.com/office/drawing/2014/main" id="{DC37902D-B358-44BD-9A3B-CD8E2882EA2D}"/>
               </a:ext>
             </a:extLst>
           </p:cNvPr>
@@ -6030,7 +6032,7 @@
           <p:cNvPr id="4" name="Image 3">
             <a:extLst>
               <a:ext uri="{FF2B5EF4-FFF2-40B4-BE49-F238E27FC236}">
-                <a16:creationId xmlns:a16="http://schemas.microsoft.com/office/drawing/2014/main" xmlns="" id="{187ADA7C-03B8-49D0-A935-DE3625BD6FA7}"/>
+                <a16:creationId xmlns="" xmlns:a16="http://schemas.microsoft.com/office/drawing/2014/main" id="{187ADA7C-03B8-49D0-A935-DE3625BD6FA7}"/>
               </a:ext>
             </a:extLst>
           </p:cNvPr>
@@ -6066,7 +6068,7 @@
           <p:cNvPr id="15" name="Titre 4">
             <a:extLst>
               <a:ext uri="{FF2B5EF4-FFF2-40B4-BE49-F238E27FC236}">
-                <a16:creationId xmlns:a16="http://schemas.microsoft.com/office/drawing/2014/main" xmlns="" id="{72E9C4E7-2BF2-4AB8-9707-825FA5757113}"/>
+                <a16:creationId xmlns="" xmlns:a16="http://schemas.microsoft.com/office/drawing/2014/main" id="{72E9C4E7-2BF2-4AB8-9707-825FA5757113}"/>
               </a:ext>
             </a:extLst>
           </p:cNvPr>
@@ -6122,7 +6124,7 @@
           <p:cNvPr id="19" name="Espace réservé du contenu 18">
             <a:extLst>
               <a:ext uri="{FF2B5EF4-FFF2-40B4-BE49-F238E27FC236}">
-                <a16:creationId xmlns:a16="http://schemas.microsoft.com/office/drawing/2014/main" xmlns="" id="{E6D00721-9CE1-4CF1-AD6A-47E2B8CCCC48}"/>
+                <a16:creationId xmlns="" xmlns:a16="http://schemas.microsoft.com/office/drawing/2014/main" id="{E6D00721-9CE1-4CF1-AD6A-47E2B8CCCC48}"/>
               </a:ext>
             </a:extLst>
           </p:cNvPr>
@@ -7195,7 +7197,7 @@
           <p:cNvPr id="2" name="Titre 1">
             <a:extLst>
               <a:ext uri="{FF2B5EF4-FFF2-40B4-BE49-F238E27FC236}">
-                <a16:creationId xmlns:a16="http://schemas.microsoft.com/office/drawing/2014/main" xmlns="" id="{48A0520F-F2B4-4144-B2A0-D31492DE5858}"/>
+                <a16:creationId xmlns="" xmlns:a16="http://schemas.microsoft.com/office/drawing/2014/main" id="{48A0520F-F2B4-4144-B2A0-D31492DE5858}"/>
               </a:ext>
             </a:extLst>
           </p:cNvPr>
@@ -7224,7 +7226,7 @@
           <p:cNvPr id="3" name="Espace réservé du numéro de diapositive 2">
             <a:extLst>
               <a:ext uri="{FF2B5EF4-FFF2-40B4-BE49-F238E27FC236}">
-                <a16:creationId xmlns:a16="http://schemas.microsoft.com/office/drawing/2014/main" xmlns="" id="{990C283F-3F6C-463B-B6FF-C5A1120E751C}"/>
+                <a16:creationId xmlns="" xmlns:a16="http://schemas.microsoft.com/office/drawing/2014/main" id="{990C283F-3F6C-463B-B6FF-C5A1120E751C}"/>
               </a:ext>
             </a:extLst>
           </p:cNvPr>
@@ -7268,7 +7270,7 @@
           <p:cNvPr id="16" name="Image 15">
             <a:extLst>
               <a:ext uri="{FF2B5EF4-FFF2-40B4-BE49-F238E27FC236}">
-                <a16:creationId xmlns:a16="http://schemas.microsoft.com/office/drawing/2014/main" xmlns="" id="{EA0235D1-1CA4-4813-8F9E-8EA6F5F92450}"/>
+                <a16:creationId xmlns="" xmlns:a16="http://schemas.microsoft.com/office/drawing/2014/main" id="{EA0235D1-1CA4-4813-8F9E-8EA6F5F92450}"/>
               </a:ext>
             </a:extLst>
           </p:cNvPr>
@@ -7304,7 +7306,7 @@
           <p:cNvPr id="27" name="Titre 4">
             <a:extLst>
               <a:ext uri="{FF2B5EF4-FFF2-40B4-BE49-F238E27FC236}">
-                <a16:creationId xmlns:a16="http://schemas.microsoft.com/office/drawing/2014/main" xmlns="" id="{9EB6429C-6B7C-4EE1-B9DC-E41E0338FCE4}"/>
+                <a16:creationId xmlns="" xmlns:a16="http://schemas.microsoft.com/office/drawing/2014/main" id="{9EB6429C-6B7C-4EE1-B9DC-E41E0338FCE4}"/>
               </a:ext>
             </a:extLst>
           </p:cNvPr>
@@ -7360,7 +7362,7 @@
           <p:cNvPr id="29" name="Espace réservé pour une image  28">
             <a:extLst>
               <a:ext uri="{FF2B5EF4-FFF2-40B4-BE49-F238E27FC236}">
-                <a16:creationId xmlns:a16="http://schemas.microsoft.com/office/drawing/2014/main" xmlns="" id="{00B39465-DFB6-4F0B-AD93-34B67A43F556}"/>
+                <a16:creationId xmlns="" xmlns:a16="http://schemas.microsoft.com/office/drawing/2014/main" id="{00B39465-DFB6-4F0B-AD93-34B67A43F556}"/>
               </a:ext>
             </a:extLst>
           </p:cNvPr>
@@ -7394,7 +7396,7 @@
           <p:cNvPr id="31" name="Espace réservé pour une image  30">
             <a:extLst>
               <a:ext uri="{FF2B5EF4-FFF2-40B4-BE49-F238E27FC236}">
-                <a16:creationId xmlns:a16="http://schemas.microsoft.com/office/drawing/2014/main" xmlns="" id="{05215E8A-C584-469C-8777-F84DF88AD457}"/>
+                <a16:creationId xmlns="" xmlns:a16="http://schemas.microsoft.com/office/drawing/2014/main" id="{05215E8A-C584-469C-8777-F84DF88AD457}"/>
               </a:ext>
             </a:extLst>
           </p:cNvPr>
@@ -7428,7 +7430,7 @@
           <p:cNvPr id="33" name="Espace réservé pour une image  32">
             <a:extLst>
               <a:ext uri="{FF2B5EF4-FFF2-40B4-BE49-F238E27FC236}">
-                <a16:creationId xmlns:a16="http://schemas.microsoft.com/office/drawing/2014/main" xmlns="" id="{F295F236-0258-44BD-A085-BC26E990060E}"/>
+                <a16:creationId xmlns="" xmlns:a16="http://schemas.microsoft.com/office/drawing/2014/main" id="{F295F236-0258-44BD-A085-BC26E990060E}"/>
               </a:ext>
             </a:extLst>
           </p:cNvPr>
@@ -7462,7 +7464,7 @@
           <p:cNvPr id="35" name="Espace réservé pour une image  34">
             <a:extLst>
               <a:ext uri="{FF2B5EF4-FFF2-40B4-BE49-F238E27FC236}">
-                <a16:creationId xmlns:a16="http://schemas.microsoft.com/office/drawing/2014/main" xmlns="" id="{10F23775-F583-446B-ADBA-A32E31D6D2FB}"/>
+                <a16:creationId xmlns="" xmlns:a16="http://schemas.microsoft.com/office/drawing/2014/main" id="{10F23775-F583-446B-ADBA-A32E31D6D2FB}"/>
               </a:ext>
             </a:extLst>
           </p:cNvPr>
@@ -7496,7 +7498,7 @@
           <p:cNvPr id="37" name="Espace réservé pour une image  36">
             <a:extLst>
               <a:ext uri="{FF2B5EF4-FFF2-40B4-BE49-F238E27FC236}">
-                <a16:creationId xmlns:a16="http://schemas.microsoft.com/office/drawing/2014/main" xmlns="" id="{CBB53359-B79D-4793-A0BA-531D16C92DB5}"/>
+                <a16:creationId xmlns="" xmlns:a16="http://schemas.microsoft.com/office/drawing/2014/main" id="{CBB53359-B79D-4793-A0BA-531D16C92DB5}"/>
               </a:ext>
             </a:extLst>
           </p:cNvPr>
@@ -7530,7 +7532,7 @@
           <p:cNvPr id="39" name="Espace réservé pour une image  38">
             <a:extLst>
               <a:ext uri="{FF2B5EF4-FFF2-40B4-BE49-F238E27FC236}">
-                <a16:creationId xmlns:a16="http://schemas.microsoft.com/office/drawing/2014/main" xmlns="" id="{7629CC81-1DE8-42E7-8943-496B487C7A15}"/>
+                <a16:creationId xmlns="" xmlns:a16="http://schemas.microsoft.com/office/drawing/2014/main" id="{7629CC81-1DE8-42E7-8943-496B487C7A15}"/>
               </a:ext>
             </a:extLst>
           </p:cNvPr>
@@ -7564,7 +7566,7 @@
           <p:cNvPr id="41" name="Espace réservé pour une image  40">
             <a:extLst>
               <a:ext uri="{FF2B5EF4-FFF2-40B4-BE49-F238E27FC236}">
-                <a16:creationId xmlns:a16="http://schemas.microsoft.com/office/drawing/2014/main" xmlns="" id="{3D9A0616-6187-42B8-A49C-5704495AFA0F}"/>
+                <a16:creationId xmlns="" xmlns:a16="http://schemas.microsoft.com/office/drawing/2014/main" id="{3D9A0616-6187-42B8-A49C-5704495AFA0F}"/>
               </a:ext>
             </a:extLst>
           </p:cNvPr>
@@ -7598,7 +7600,7 @@
           <p:cNvPr id="43" name="Espace réservé pour une image  42">
             <a:extLst>
               <a:ext uri="{FF2B5EF4-FFF2-40B4-BE49-F238E27FC236}">
-                <a16:creationId xmlns:a16="http://schemas.microsoft.com/office/drawing/2014/main" xmlns="" id="{10BA3FEF-381F-4AA8-9215-136F5361141D}"/>
+                <a16:creationId xmlns="" xmlns:a16="http://schemas.microsoft.com/office/drawing/2014/main" id="{10BA3FEF-381F-4AA8-9215-136F5361141D}"/>
               </a:ext>
             </a:extLst>
           </p:cNvPr>
@@ -7632,7 +7634,7 @@
           <p:cNvPr id="45" name="Espace réservé pour une image  44">
             <a:extLst>
               <a:ext uri="{FF2B5EF4-FFF2-40B4-BE49-F238E27FC236}">
-                <a16:creationId xmlns:a16="http://schemas.microsoft.com/office/drawing/2014/main" xmlns="" id="{8FD27BC5-345B-4477-941A-3575E8185B4F}"/>
+                <a16:creationId xmlns="" xmlns:a16="http://schemas.microsoft.com/office/drawing/2014/main" id="{8FD27BC5-345B-4477-941A-3575E8185B4F}"/>
               </a:ext>
             </a:extLst>
           </p:cNvPr>
@@ -7696,7 +7698,7 @@
           <p:cNvPr id="2" name="Titre 1">
             <a:extLst>
               <a:ext uri="{FF2B5EF4-FFF2-40B4-BE49-F238E27FC236}">
-                <a16:creationId xmlns:a16="http://schemas.microsoft.com/office/drawing/2014/main" xmlns="" id="{9BDD946C-1F13-4F67-B8D1-64EF5CF71ABB}"/>
+                <a16:creationId xmlns="" xmlns:a16="http://schemas.microsoft.com/office/drawing/2014/main" id="{9BDD946C-1F13-4F67-B8D1-64EF5CF71ABB}"/>
               </a:ext>
             </a:extLst>
           </p:cNvPr>
@@ -7725,7 +7727,7 @@
           <p:cNvPr id="3" name="Espace réservé du numéro de diapositive 2">
             <a:extLst>
               <a:ext uri="{FF2B5EF4-FFF2-40B4-BE49-F238E27FC236}">
-                <a16:creationId xmlns:a16="http://schemas.microsoft.com/office/drawing/2014/main" xmlns="" id="{DC37902D-B358-44BD-9A3B-CD8E2882EA2D}"/>
+                <a16:creationId xmlns="" xmlns:a16="http://schemas.microsoft.com/office/drawing/2014/main" id="{DC37902D-B358-44BD-9A3B-CD8E2882EA2D}"/>
               </a:ext>
             </a:extLst>
           </p:cNvPr>
@@ -7769,7 +7771,7 @@
           <p:cNvPr id="4" name="Image 3">
             <a:extLst>
               <a:ext uri="{FF2B5EF4-FFF2-40B4-BE49-F238E27FC236}">
-                <a16:creationId xmlns:a16="http://schemas.microsoft.com/office/drawing/2014/main" xmlns="" id="{187ADA7C-03B8-49D0-A935-DE3625BD6FA7}"/>
+                <a16:creationId xmlns="" xmlns:a16="http://schemas.microsoft.com/office/drawing/2014/main" id="{187ADA7C-03B8-49D0-A935-DE3625BD6FA7}"/>
               </a:ext>
             </a:extLst>
           </p:cNvPr>
@@ -7805,7 +7807,7 @@
           <p:cNvPr id="15" name="Titre 4">
             <a:extLst>
               <a:ext uri="{FF2B5EF4-FFF2-40B4-BE49-F238E27FC236}">
-                <a16:creationId xmlns:a16="http://schemas.microsoft.com/office/drawing/2014/main" xmlns="" id="{72E9C4E7-2BF2-4AB8-9707-825FA5757113}"/>
+                <a16:creationId xmlns="" xmlns:a16="http://schemas.microsoft.com/office/drawing/2014/main" id="{72E9C4E7-2BF2-4AB8-9707-825FA5757113}"/>
               </a:ext>
             </a:extLst>
           </p:cNvPr>
@@ -7861,7 +7863,7 @@
           <p:cNvPr id="19" name="Espace réservé du contenu 18">
             <a:extLst>
               <a:ext uri="{FF2B5EF4-FFF2-40B4-BE49-F238E27FC236}">
-                <a16:creationId xmlns:a16="http://schemas.microsoft.com/office/drawing/2014/main" xmlns="" id="{E6D00721-9CE1-4CF1-AD6A-47E2B8CCCC48}"/>
+                <a16:creationId xmlns="" xmlns:a16="http://schemas.microsoft.com/office/drawing/2014/main" id="{E6D00721-9CE1-4CF1-AD6A-47E2B8CCCC48}"/>
               </a:ext>
             </a:extLst>
           </p:cNvPr>
@@ -8919,7 +8921,7 @@
                   </a:schemeClr>
                 </a:solidFill>
               </a:rPr>
-              <a:t>11 septembre 2019</a:t>
+              <a:t>13 septembre 2019</a:t>
             </a:fld>
             <a:endParaRPr lang="fr-FR" sz="1100" dirty="0">
               <a:solidFill>
@@ -9953,7 +9955,7 @@
                   </a:schemeClr>
                 </a:solidFill>
               </a:rPr>
-              <a:t>11 septembre 2019</a:t>
+              <a:t>13 septembre 2019</a:t>
             </a:fld>
             <a:endParaRPr lang="fr-FR" sz="1100" dirty="0">
               <a:solidFill>
@@ -10980,7 +10982,7 @@
                   </a:schemeClr>
                 </a:solidFill>
               </a:rPr>
-              <a:t>11 septembre 2019</a:t>
+              <a:t>13 septembre 2019</a:t>
             </a:fld>
             <a:endParaRPr lang="fr-FR" sz="1100" dirty="0">
               <a:solidFill>
@@ -11487,6 +11489,858 @@
 </p:sld>
 </file>
 
+<file path=ppt/slides/slide10.xml><?xml version="1.0" encoding="utf-8"?>
+<p:sld xmlns:a="http://schemas.openxmlformats.org/drawingml/2006/main" xmlns:r="http://schemas.openxmlformats.org/officeDocument/2006/relationships" xmlns:p="http://schemas.openxmlformats.org/presentationml/2006/main">
+  <p:cSld>
+    <p:spTree>
+      <p:nvGrpSpPr>
+        <p:cNvPr id="1" name=""/>
+        <p:cNvGrpSpPr/>
+        <p:nvPr/>
+      </p:nvGrpSpPr>
+      <p:grpSpPr>
+        <a:xfrm>
+          <a:off x="0" y="0"/>
+          <a:ext cx="0" cy="0"/>
+          <a:chOff x="0" y="0"/>
+          <a:chExt cx="0" cy="0"/>
+        </a:xfrm>
+      </p:grpSpPr>
+      <p:pic>
+        <p:nvPicPr>
+          <p:cNvPr id="1026" name="Picture 2"/>
+          <p:cNvPicPr>
+            <a:picLocks noChangeAspect="1" noChangeArrowheads="1"/>
+          </p:cNvPicPr>
+          <p:nvPr/>
+        </p:nvPicPr>
+        <p:blipFill>
+          <a:blip r:embed="rId2">
+            <a:extLst>
+              <a:ext uri="{28A0092B-C50C-407E-A947-70E740481C1C}">
+                <a14:useLocalDpi xmlns:a14="http://schemas.microsoft.com/office/drawing/2010/main" val="0"/>
+              </a:ext>
+            </a:extLst>
+          </a:blip>
+          <a:srcRect/>
+          <a:stretch>
+            <a:fillRect/>
+          </a:stretch>
+        </p:blipFill>
+        <p:spPr bwMode="auto">
+          <a:xfrm>
+            <a:off x="26894" y="1657350"/>
+            <a:ext cx="6572250" cy="5200650"/>
+          </a:xfrm>
+          <a:prstGeom prst="rect">
+            <a:avLst/>
+          </a:prstGeom>
+          <a:noFill/>
+          <a:ln>
+            <a:noFill/>
+          </a:ln>
+          <a:extLst>
+            <a:ext uri="{909E8E84-426E-40DD-AFC4-6F175D3DCCD1}">
+              <a14:hiddenFill xmlns:a14="http://schemas.microsoft.com/office/drawing/2010/main">
+                <a:solidFill>
+                  <a:schemeClr val="accent1"/>
+                </a:solidFill>
+              </a14:hiddenFill>
+            </a:ext>
+            <a:ext uri="{91240B29-F687-4F45-9708-019B960494DF}">
+              <a14:hiddenLine xmlns:a14="http://schemas.microsoft.com/office/drawing/2010/main" w="9525">
+                <a:solidFill>
+                  <a:schemeClr val="tx1"/>
+                </a:solidFill>
+                <a:miter lim="800000"/>
+                <a:headEnd/>
+                <a:tailEnd/>
+              </a14:hiddenLine>
+            </a:ext>
+          </a:extLst>
+        </p:spPr>
+      </p:pic>
+      <p:sp>
+        <p:nvSpPr>
+          <p:cNvPr id="2" name="Titre 1"/>
+          <p:cNvSpPr>
+            <a:spLocks noGrp="1"/>
+          </p:cNvSpPr>
+          <p:nvPr>
+            <p:ph type="title"/>
+          </p:nvPr>
+        </p:nvSpPr>
+        <p:spPr/>
+        <p:txBody>
+          <a:bodyPr/>
+          <a:lstStyle/>
+          <a:p>
+            <a:r>
+              <a:rPr lang="fr-FR" dirty="0" smtClean="0"/>
+              <a:t>Vendredi 13/09/2019</a:t>
+            </a:r>
+            <a:endParaRPr lang="en-GB" dirty="0"/>
+          </a:p>
+        </p:txBody>
+      </p:sp>
+      <p:sp>
+        <p:nvSpPr>
+          <p:cNvPr id="3" name="Espace réservé du numéro de diapositive 2"/>
+          <p:cNvSpPr>
+            <a:spLocks noGrp="1"/>
+          </p:cNvSpPr>
+          <p:nvPr>
+            <p:ph type="sldNum" sz="quarter" idx="10"/>
+          </p:nvPr>
+        </p:nvSpPr>
+        <p:spPr/>
+        <p:txBody>
+          <a:bodyPr/>
+          <a:lstStyle/>
+          <a:p>
+            <a:pPr algn="ctr"/>
+            <a:fld id="{854A34C9-9A4B-6445-85E1-F779B5E87362}" type="slidenum">
+              <a:rPr lang="fr-FR" sz="1000" noProof="0" smtClean="0">
+                <a:solidFill>
+                  <a:schemeClr val="bg1"/>
+                </a:solidFill>
+                <a:latin typeface="Arial" charset="0"/>
+                <a:ea typeface="Arial" charset="0"/>
+                <a:cs typeface="Arial" charset="0"/>
+              </a:rPr>
+              <a:pPr algn="ctr"/>
+              <a:t>10</a:t>
+            </a:fld>
+            <a:endParaRPr lang="fr-FR" sz="1000" noProof="0" dirty="0">
+              <a:solidFill>
+                <a:schemeClr val="bg1"/>
+              </a:solidFill>
+              <a:latin typeface="Arial" charset="0"/>
+              <a:ea typeface="Arial" charset="0"/>
+              <a:cs typeface="Arial" charset="0"/>
+            </a:endParaRPr>
+          </a:p>
+        </p:txBody>
+      </p:sp>
+      <p:sp>
+        <p:nvSpPr>
+          <p:cNvPr id="4" name="Espace réservé du texte 3"/>
+          <p:cNvSpPr>
+            <a:spLocks noGrp="1"/>
+          </p:cNvSpPr>
+          <p:nvPr>
+            <p:ph type="body" sz="quarter" idx="12"/>
+          </p:nvPr>
+        </p:nvSpPr>
+        <p:spPr>
+          <a:xfrm>
+            <a:off x="660825" y="1067647"/>
+            <a:ext cx="7924376" cy="378270"/>
+          </a:xfrm>
+        </p:spPr>
+        <p:txBody>
+          <a:bodyPr/>
+          <a:lstStyle/>
+          <a:p>
+            <a:r>
+              <a:rPr lang="fr-FR" dirty="0" smtClean="0"/>
+              <a:t>Moyenne des tensions entre 4.06 et 4.16 pour </a:t>
+            </a:r>
+            <a:r>
+              <a:rPr lang="fr-FR" dirty="0"/>
+              <a:t>les chocs </a:t>
+            </a:r>
+            <a:r>
+              <a:rPr lang="fr-FR" dirty="0" smtClean="0"/>
+              <a:t>55108 à 55114</a:t>
+            </a:r>
+            <a:endParaRPr lang="en-GB" dirty="0" smtClean="0"/>
+          </a:p>
+        </p:txBody>
+      </p:sp>
+      <p:pic>
+        <p:nvPicPr>
+          <p:cNvPr id="1027" name="Picture 3"/>
+          <p:cNvPicPr>
+            <a:picLocks noChangeAspect="1" noChangeArrowheads="1"/>
+          </p:cNvPicPr>
+          <p:nvPr/>
+        </p:nvPicPr>
+        <p:blipFill>
+          <a:blip r:embed="rId3">
+            <a:extLst>
+              <a:ext uri="{28A0092B-C50C-407E-A947-70E740481C1C}">
+                <a14:useLocalDpi xmlns:a14="http://schemas.microsoft.com/office/drawing/2010/main" val="0"/>
+              </a:ext>
+            </a:extLst>
+          </a:blip>
+          <a:srcRect/>
+          <a:stretch>
+            <a:fillRect/>
+          </a:stretch>
+        </p:blipFill>
+        <p:spPr bwMode="auto">
+          <a:xfrm>
+            <a:off x="26894" y="1413435"/>
+            <a:ext cx="8032750" cy="5232400"/>
+          </a:xfrm>
+          <a:prstGeom prst="rect">
+            <a:avLst/>
+          </a:prstGeom>
+          <a:noFill/>
+          <a:ln>
+            <a:noFill/>
+          </a:ln>
+          <a:extLst>
+            <a:ext uri="{909E8E84-426E-40DD-AFC4-6F175D3DCCD1}">
+              <a14:hiddenFill xmlns:a14="http://schemas.microsoft.com/office/drawing/2010/main">
+                <a:solidFill>
+                  <a:schemeClr val="accent1"/>
+                </a:solidFill>
+              </a14:hiddenFill>
+            </a:ext>
+            <a:ext uri="{91240B29-F687-4F45-9708-019B960494DF}">
+              <a14:hiddenLine xmlns:a14="http://schemas.microsoft.com/office/drawing/2010/main" w="9525">
+                <a:solidFill>
+                  <a:schemeClr val="tx1"/>
+                </a:solidFill>
+                <a:miter lim="800000"/>
+                <a:headEnd/>
+                <a:tailEnd/>
+              </a14:hiddenLine>
+            </a:ext>
+          </a:extLst>
+        </p:spPr>
+      </p:pic>
+      <p:graphicFrame>
+        <p:nvGraphicFramePr>
+          <p:cNvPr id="5" name="Tableau 4"/>
+          <p:cNvGraphicFramePr>
+            <a:graphicFrameLocks noGrp="1"/>
+          </p:cNvGraphicFramePr>
+          <p:nvPr>
+            <p:extLst>
+              <p:ext uri="{D42A27DB-BD31-4B8C-83A1-F6EECF244321}">
+                <p14:modId xmlns:p14="http://schemas.microsoft.com/office/powerpoint/2010/main" val="3423038807"/>
+              </p:ext>
+            </p:extLst>
+          </p:nvPr>
+        </p:nvGraphicFramePr>
+        <p:xfrm>
+          <a:off x="4679579" y="2575112"/>
+          <a:ext cx="4312023" cy="1905000"/>
+        </p:xfrm>
+        <a:graphic>
+          <a:graphicData uri="http://schemas.openxmlformats.org/drawingml/2006/table">
+            <a:tbl>
+              <a:tblPr firstRow="1" bandRow="1">
+                <a:tableStyleId>{5C22544A-7EE6-4342-B048-85BDC9FD1C3A}</a:tableStyleId>
+              </a:tblPr>
+              <a:tblGrid>
+                <a:gridCol w="1622706"/>
+                <a:gridCol w="793119"/>
+                <a:gridCol w="948099"/>
+                <a:gridCol w="948099"/>
+              </a:tblGrid>
+              <a:tr h="370840">
+                <a:tc>
+                  <a:txBody>
+                    <a:bodyPr/>
+                    <a:lstStyle/>
+                    <a:p>
+                      <a:endParaRPr lang="en-GB" dirty="0"/>
+                    </a:p>
+                  </a:txBody>
+                  <a:tcPr/>
+                </a:tc>
+                <a:tc>
+                  <a:txBody>
+                    <a:bodyPr/>
+                    <a:lstStyle/>
+                    <a:p>
+                      <a:pPr algn="ctr"/>
+                      <a:r>
+                        <a:rPr lang="fr-FR" dirty="0" smtClean="0"/>
+                        <a:t>V</a:t>
+                      </a:r>
+                      <a:r>
+                        <a:rPr lang="fr-FR" baseline="-25000" dirty="0" smtClean="0"/>
+                        <a:t>Q2</a:t>
+                      </a:r>
+                      <a:endParaRPr lang="en-GB" baseline="-25000" dirty="0"/>
+                    </a:p>
+                  </a:txBody>
+                  <a:tcPr/>
+                </a:tc>
+                <a:tc>
+                  <a:txBody>
+                    <a:bodyPr/>
+                    <a:lstStyle/>
+                    <a:p>
+                      <a:pPr algn="ctr"/>
+                      <a:r>
+                        <a:rPr lang="fr-FR" dirty="0" smtClean="0"/>
+                        <a:t>V</a:t>
+                      </a:r>
+                      <a:r>
+                        <a:rPr lang="fr-FR" baseline="-25000" dirty="0" smtClean="0"/>
+                        <a:t>Q4</a:t>
+                      </a:r>
+                      <a:endParaRPr lang="en-GB" baseline="-25000" dirty="0"/>
+                    </a:p>
+                  </a:txBody>
+                  <a:tcPr/>
+                </a:tc>
+                <a:tc>
+                  <a:txBody>
+                    <a:bodyPr/>
+                    <a:lstStyle/>
+                    <a:p>
+                      <a:pPr algn="ctr"/>
+                      <a:r>
+                        <a:rPr lang="fr-FR" dirty="0" smtClean="0"/>
+                        <a:t>V</a:t>
+                      </a:r>
+                      <a:r>
+                        <a:rPr lang="fr-FR" baseline="-25000" dirty="0" smtClean="0"/>
+                        <a:t>Q2</a:t>
+                      </a:r>
+                      <a:r>
+                        <a:rPr lang="fr-FR" dirty="0" smtClean="0"/>
+                        <a:t>/V</a:t>
+                      </a:r>
+                      <a:r>
+                        <a:rPr lang="fr-FR" baseline="-25000" dirty="0" smtClean="0"/>
+                        <a:t>Q4</a:t>
+                      </a:r>
+                      <a:endParaRPr lang="en-GB" baseline="-25000" dirty="0"/>
+                    </a:p>
+                  </a:txBody>
+                  <a:tcPr/>
+                </a:tc>
+              </a:tr>
+              <a:tr h="370840">
+                <a:tc>
+                  <a:txBody>
+                    <a:bodyPr/>
+                    <a:lstStyle/>
+                    <a:p>
+                      <a:r>
+                        <a:rPr lang="fr-FR" dirty="0" smtClean="0"/>
+                        <a:t>Gauche Haut</a:t>
+                      </a:r>
+                      <a:endParaRPr lang="en-GB" dirty="0"/>
+                    </a:p>
+                  </a:txBody>
+                  <a:tcPr/>
+                </a:tc>
+                <a:tc>
+                  <a:txBody>
+                    <a:bodyPr/>
+                    <a:lstStyle/>
+                    <a:p>
+                      <a:pPr algn="ctr"/>
+                      <a:r>
+                        <a:rPr lang="fr-FR" dirty="0" smtClean="0"/>
+                        <a:t>15</a:t>
+                      </a:r>
+                      <a:endParaRPr lang="en-GB" dirty="0"/>
+                    </a:p>
+                  </a:txBody>
+                  <a:tcPr/>
+                </a:tc>
+                <a:tc>
+                  <a:txBody>
+                    <a:bodyPr/>
+                    <a:lstStyle/>
+                    <a:p>
+                      <a:pPr algn="ctr"/>
+                      <a:r>
+                        <a:rPr lang="fr-FR" dirty="0" smtClean="0"/>
+                        <a:t>11.95</a:t>
+                      </a:r>
+                      <a:endParaRPr lang="en-GB" dirty="0"/>
+                    </a:p>
+                  </a:txBody>
+                  <a:tcPr/>
+                </a:tc>
+                <a:tc>
+                  <a:txBody>
+                    <a:bodyPr/>
+                    <a:lstStyle/>
+                    <a:p>
+                      <a:pPr algn="ctr"/>
+                      <a:r>
+                        <a:rPr lang="fr-FR" dirty="0" smtClean="0"/>
+                        <a:t>1.25</a:t>
+                      </a:r>
+                      <a:endParaRPr lang="en-GB" dirty="0"/>
+                    </a:p>
+                  </a:txBody>
+                  <a:tcPr/>
+                </a:tc>
+              </a:tr>
+              <a:tr h="370840">
+                <a:tc>
+                  <a:txBody>
+                    <a:bodyPr/>
+                    <a:lstStyle/>
+                    <a:p>
+                      <a:r>
+                        <a:rPr lang="fr-FR" dirty="0" smtClean="0"/>
+                        <a:t>Gauche Bas </a:t>
+                      </a:r>
+                      <a:endParaRPr lang="en-GB" dirty="0"/>
+                    </a:p>
+                  </a:txBody>
+                  <a:tcPr/>
+                </a:tc>
+                <a:tc>
+                  <a:txBody>
+                    <a:bodyPr/>
+                    <a:lstStyle/>
+                    <a:p>
+                      <a:pPr algn="ctr"/>
+                      <a:r>
+                        <a:rPr lang="fr-FR" dirty="0" smtClean="0"/>
+                        <a:t>19.9</a:t>
+                      </a:r>
+                      <a:endParaRPr lang="en-GB" dirty="0"/>
+                    </a:p>
+                  </a:txBody>
+                  <a:tcPr/>
+                </a:tc>
+                <a:tc>
+                  <a:txBody>
+                    <a:bodyPr/>
+                    <a:lstStyle/>
+                    <a:p>
+                      <a:pPr algn="ctr"/>
+                      <a:r>
+                        <a:rPr lang="fr-FR" dirty="0" smtClean="0"/>
+                        <a:t>16.1</a:t>
+                      </a:r>
+                      <a:endParaRPr lang="en-GB" dirty="0"/>
+                    </a:p>
+                  </a:txBody>
+                  <a:tcPr/>
+                </a:tc>
+                <a:tc>
+                  <a:txBody>
+                    <a:bodyPr/>
+                    <a:lstStyle/>
+                    <a:p>
+                      <a:pPr algn="ctr"/>
+                      <a:r>
+                        <a:rPr lang="fr-FR" dirty="0" smtClean="0"/>
+                        <a:t>1.23</a:t>
+                      </a:r>
+                      <a:endParaRPr lang="en-GB" dirty="0"/>
+                    </a:p>
+                  </a:txBody>
+                  <a:tcPr/>
+                </a:tc>
+              </a:tr>
+              <a:tr h="370840">
+                <a:tc>
+                  <a:txBody>
+                    <a:bodyPr/>
+                    <a:lstStyle/>
+                    <a:p>
+                      <a:r>
+                        <a:rPr lang="fr-FR" dirty="0" smtClean="0"/>
+                        <a:t>Droit Haut</a:t>
+                      </a:r>
+                      <a:endParaRPr lang="en-GB" dirty="0"/>
+                    </a:p>
+                  </a:txBody>
+                  <a:tcPr/>
+                </a:tc>
+                <a:tc>
+                  <a:txBody>
+                    <a:bodyPr/>
+                    <a:lstStyle/>
+                    <a:p>
+                      <a:pPr algn="ctr"/>
+                      <a:r>
+                        <a:rPr lang="fr-FR" dirty="0" smtClean="0"/>
+                        <a:t>16.7</a:t>
+                      </a:r>
+                      <a:endParaRPr lang="en-GB" dirty="0"/>
+                    </a:p>
+                  </a:txBody>
+                  <a:tcPr/>
+                </a:tc>
+                <a:tc>
+                  <a:txBody>
+                    <a:bodyPr/>
+                    <a:lstStyle/>
+                    <a:p>
+                      <a:pPr algn="ctr"/>
+                      <a:r>
+                        <a:rPr lang="fr-FR" dirty="0" smtClean="0"/>
+                        <a:t>12.3</a:t>
+                      </a:r>
+                      <a:endParaRPr lang="en-GB" dirty="0"/>
+                    </a:p>
+                  </a:txBody>
+                  <a:tcPr/>
+                </a:tc>
+                <a:tc>
+                  <a:txBody>
+                    <a:bodyPr/>
+                    <a:lstStyle/>
+                    <a:p>
+                      <a:pPr algn="ctr"/>
+                      <a:r>
+                        <a:rPr lang="fr-FR" dirty="0" smtClean="0"/>
+                        <a:t>1.35</a:t>
+                      </a:r>
+                      <a:endParaRPr lang="en-GB" dirty="0"/>
+                    </a:p>
+                  </a:txBody>
+                  <a:tcPr/>
+                </a:tc>
+              </a:tr>
+              <a:tr h="370840">
+                <a:tc>
+                  <a:txBody>
+                    <a:bodyPr/>
+                    <a:lstStyle/>
+                    <a:p>
+                      <a:r>
+                        <a:rPr lang="fr-FR" dirty="0" smtClean="0"/>
+                        <a:t>Droit Bas</a:t>
+                      </a:r>
+                      <a:endParaRPr lang="en-GB" dirty="0"/>
+                    </a:p>
+                  </a:txBody>
+                  <a:tcPr/>
+                </a:tc>
+                <a:tc>
+                  <a:txBody>
+                    <a:bodyPr/>
+                    <a:lstStyle/>
+                    <a:p>
+                      <a:pPr algn="ctr"/>
+                      <a:r>
+                        <a:rPr lang="fr-FR" dirty="0" smtClean="0"/>
+                        <a:t>13.9</a:t>
+                      </a:r>
+                      <a:endParaRPr lang="en-GB" dirty="0"/>
+                    </a:p>
+                  </a:txBody>
+                  <a:tcPr/>
+                </a:tc>
+                <a:tc>
+                  <a:txBody>
+                    <a:bodyPr/>
+                    <a:lstStyle/>
+                    <a:p>
+                      <a:pPr algn="ctr"/>
+                      <a:r>
+                        <a:rPr lang="fr-FR" dirty="0" smtClean="0"/>
+                        <a:t>16.5</a:t>
+                      </a:r>
+                      <a:endParaRPr lang="en-GB" dirty="0"/>
+                    </a:p>
+                  </a:txBody>
+                  <a:tcPr/>
+                </a:tc>
+                <a:tc>
+                  <a:txBody>
+                    <a:bodyPr/>
+                    <a:lstStyle/>
+                    <a:p>
+                      <a:pPr algn="ctr"/>
+                      <a:r>
+                        <a:rPr lang="fr-FR" dirty="0" smtClean="0"/>
+                        <a:t>0.84</a:t>
+                      </a:r>
+                      <a:endParaRPr lang="en-GB" dirty="0"/>
+                    </a:p>
+                  </a:txBody>
+                  <a:tcPr/>
+                </a:tc>
+              </a:tr>
+            </a:tbl>
+          </a:graphicData>
+        </a:graphic>
+      </p:graphicFrame>
+    </p:spTree>
+    <p:extLst>
+      <p:ext uri="{BB962C8B-B14F-4D97-AF65-F5344CB8AC3E}">
+        <p14:creationId xmlns:p14="http://schemas.microsoft.com/office/powerpoint/2010/main" val="1836057680"/>
+      </p:ext>
+    </p:extLst>
+  </p:cSld>
+  <p:clrMapOvr>
+    <a:masterClrMapping/>
+  </p:clrMapOvr>
+</p:sld>
+</file>
+
+<file path=ppt/slides/slide11.xml><?xml version="1.0" encoding="utf-8"?>
+<p:sld xmlns:a="http://schemas.openxmlformats.org/drawingml/2006/main" xmlns:r="http://schemas.openxmlformats.org/officeDocument/2006/relationships" xmlns:p="http://schemas.openxmlformats.org/presentationml/2006/main">
+  <p:cSld>
+    <p:spTree>
+      <p:nvGrpSpPr>
+        <p:cNvPr id="1" name=""/>
+        <p:cNvGrpSpPr/>
+        <p:nvPr/>
+      </p:nvGrpSpPr>
+      <p:grpSpPr>
+        <a:xfrm>
+          <a:off x="0" y="0"/>
+          <a:ext cx="0" cy="0"/>
+          <a:chOff x="0" y="0"/>
+          <a:chExt cx="0" cy="0"/>
+        </a:xfrm>
+      </p:grpSpPr>
+      <p:sp>
+        <p:nvSpPr>
+          <p:cNvPr id="2" name="Titre 1"/>
+          <p:cNvSpPr>
+            <a:spLocks noGrp="1"/>
+          </p:cNvSpPr>
+          <p:nvPr>
+            <p:ph type="title"/>
+          </p:nvPr>
+        </p:nvSpPr>
+        <p:spPr/>
+        <p:txBody>
+          <a:bodyPr/>
+          <a:lstStyle/>
+          <a:p>
+            <a:endParaRPr lang="en-GB"/>
+          </a:p>
+        </p:txBody>
+      </p:sp>
+      <p:sp>
+        <p:nvSpPr>
+          <p:cNvPr id="3" name="Espace réservé du numéro de diapositive 2"/>
+          <p:cNvSpPr>
+            <a:spLocks noGrp="1"/>
+          </p:cNvSpPr>
+          <p:nvPr>
+            <p:ph type="sldNum" sz="quarter" idx="10"/>
+          </p:nvPr>
+        </p:nvSpPr>
+        <p:spPr/>
+        <p:txBody>
+          <a:bodyPr/>
+          <a:lstStyle/>
+          <a:p>
+            <a:pPr algn="ctr"/>
+            <a:fld id="{854A34C9-9A4B-6445-85E1-F779B5E87362}" type="slidenum">
+              <a:rPr lang="fr-FR" sz="1000" noProof="0" smtClean="0">
+                <a:solidFill>
+                  <a:schemeClr val="bg1"/>
+                </a:solidFill>
+                <a:latin typeface="Arial" charset="0"/>
+                <a:ea typeface="Arial" charset="0"/>
+                <a:cs typeface="Arial" charset="0"/>
+              </a:rPr>
+              <a:pPr algn="ctr"/>
+              <a:t>11</a:t>
+            </a:fld>
+            <a:endParaRPr lang="fr-FR" sz="1000" noProof="0" dirty="0">
+              <a:solidFill>
+                <a:schemeClr val="bg1"/>
+              </a:solidFill>
+              <a:latin typeface="Arial" charset="0"/>
+              <a:ea typeface="Arial" charset="0"/>
+              <a:cs typeface="Arial" charset="0"/>
+            </a:endParaRPr>
+          </a:p>
+        </p:txBody>
+      </p:sp>
+      <p:sp>
+        <p:nvSpPr>
+          <p:cNvPr id="4" name="Espace réservé du texte 3"/>
+          <p:cNvSpPr>
+            <a:spLocks noGrp="1"/>
+          </p:cNvSpPr>
+          <p:nvPr>
+            <p:ph type="body" sz="quarter" idx="12"/>
+          </p:nvPr>
+        </p:nvSpPr>
+        <p:spPr/>
+        <p:txBody>
+          <a:bodyPr/>
+          <a:lstStyle/>
+          <a:p>
+            <a:endParaRPr lang="en-GB"/>
+          </a:p>
+        </p:txBody>
+      </p:sp>
+      <p:pic>
+        <p:nvPicPr>
+          <p:cNvPr id="2050" name="Picture 2"/>
+          <p:cNvPicPr>
+            <a:picLocks noChangeAspect="1" noChangeArrowheads="1"/>
+          </p:cNvPicPr>
+          <p:nvPr/>
+        </p:nvPicPr>
+        <p:blipFill>
+          <a:blip r:embed="rId2">
+            <a:extLst>
+              <a:ext uri="{28A0092B-C50C-407E-A947-70E740481C1C}">
+                <a14:useLocalDpi xmlns:a14="http://schemas.microsoft.com/office/drawing/2010/main" val="0"/>
+              </a:ext>
+            </a:extLst>
+          </a:blip>
+          <a:srcRect/>
+          <a:stretch>
+            <a:fillRect/>
+          </a:stretch>
+        </p:blipFill>
+        <p:spPr bwMode="auto">
+          <a:xfrm>
+            <a:off x="444314" y="1028513"/>
+            <a:ext cx="7753350" cy="5518150"/>
+          </a:xfrm>
+          <a:prstGeom prst="rect">
+            <a:avLst/>
+          </a:prstGeom>
+          <a:noFill/>
+          <a:ln>
+            <a:noFill/>
+          </a:ln>
+          <a:extLst>
+            <a:ext uri="{909E8E84-426E-40DD-AFC4-6F175D3DCCD1}">
+              <a14:hiddenFill xmlns:a14="http://schemas.microsoft.com/office/drawing/2010/main">
+                <a:solidFill>
+                  <a:schemeClr val="accent1"/>
+                </a:solidFill>
+              </a14:hiddenFill>
+            </a:ext>
+            <a:ext uri="{91240B29-F687-4F45-9708-019B960494DF}">
+              <a14:hiddenLine xmlns:a14="http://schemas.microsoft.com/office/drawing/2010/main" w="9525">
+                <a:solidFill>
+                  <a:schemeClr val="tx1"/>
+                </a:solidFill>
+                <a:miter lim="800000"/>
+                <a:headEnd/>
+                <a:tailEnd/>
+              </a14:hiddenLine>
+            </a:ext>
+          </a:extLst>
+        </p:spPr>
+      </p:pic>
+      <p:sp>
+        <p:nvSpPr>
+          <p:cNvPr id="5" name="ZoneTexte 4"/>
+          <p:cNvSpPr txBox="1"/>
+          <p:nvPr/>
+        </p:nvSpPr>
+        <p:spPr>
+          <a:xfrm>
+            <a:off x="5163671" y="1667435"/>
+            <a:ext cx="1635576" cy="646331"/>
+          </a:xfrm>
+          <a:prstGeom prst="rect">
+            <a:avLst/>
+          </a:prstGeom>
+          <a:noFill/>
+        </p:spPr>
+        <p:txBody>
+          <a:bodyPr wrap="none" rtlCol="0">
+            <a:spAutoFit/>
+          </a:bodyPr>
+          <a:lstStyle/>
+          <a:p>
+            <a:pPr algn="l"/>
+            <a:r>
+              <a:rPr lang="fr-FR" sz="1800" dirty="0" smtClean="0"/>
+              <a:t>Gauche:</a:t>
+            </a:r>
+          </a:p>
+          <a:p>
+            <a:pPr algn="l"/>
+            <a:r>
+              <a:rPr lang="fr-FR" sz="1800" dirty="0" smtClean="0"/>
+              <a:t>SWR</a:t>
+            </a:r>
+            <a:r>
+              <a:rPr lang="fr-FR" sz="1800" baseline="-25000" dirty="0" smtClean="0"/>
+              <a:t>Q4</a:t>
+            </a:r>
+            <a:r>
+              <a:rPr lang="fr-FR" sz="1800" dirty="0" smtClean="0"/>
+              <a:t> &gt; SWR</a:t>
+            </a:r>
+            <a:r>
+              <a:rPr lang="fr-FR" sz="1800" baseline="-25000" dirty="0" smtClean="0"/>
+              <a:t>Q2</a:t>
+            </a:r>
+            <a:endParaRPr lang="en-GB" sz="1800" baseline="-25000" dirty="0"/>
+          </a:p>
+        </p:txBody>
+      </p:sp>
+      <p:sp>
+        <p:nvSpPr>
+          <p:cNvPr id="7" name="ZoneTexte 6"/>
+          <p:cNvSpPr txBox="1"/>
+          <p:nvPr/>
+        </p:nvSpPr>
+        <p:spPr>
+          <a:xfrm>
+            <a:off x="5163671" y="4087906"/>
+            <a:ext cx="1635576" cy="646331"/>
+          </a:xfrm>
+          <a:prstGeom prst="rect">
+            <a:avLst/>
+          </a:prstGeom>
+          <a:noFill/>
+        </p:spPr>
+        <p:txBody>
+          <a:bodyPr wrap="none" rtlCol="0">
+            <a:spAutoFit/>
+          </a:bodyPr>
+          <a:lstStyle/>
+          <a:p>
+            <a:pPr algn="l"/>
+            <a:r>
+              <a:rPr lang="fr-FR" sz="1800" dirty="0" smtClean="0"/>
+              <a:t>Droit:</a:t>
+            </a:r>
+          </a:p>
+          <a:p>
+            <a:pPr algn="l"/>
+            <a:r>
+              <a:rPr lang="fr-FR" sz="1800" dirty="0" smtClean="0"/>
+              <a:t>SWR</a:t>
+            </a:r>
+            <a:r>
+              <a:rPr lang="fr-FR" sz="1800" baseline="-25000" dirty="0" smtClean="0"/>
+              <a:t>Q4</a:t>
+            </a:r>
+            <a:r>
+              <a:rPr lang="fr-FR" sz="1800" dirty="0" smtClean="0"/>
+              <a:t> &lt; SWR</a:t>
+            </a:r>
+            <a:r>
+              <a:rPr lang="fr-FR" sz="1800" baseline="-25000" dirty="0" smtClean="0"/>
+              <a:t>Q2</a:t>
+            </a:r>
+            <a:endParaRPr lang="en-GB" sz="1800" baseline="-25000" dirty="0"/>
+          </a:p>
+        </p:txBody>
+      </p:sp>
+    </p:spTree>
+    <p:extLst>
+      <p:ext uri="{BB962C8B-B14F-4D97-AF65-F5344CB8AC3E}">
+        <p14:creationId xmlns:p14="http://schemas.microsoft.com/office/powerpoint/2010/main" val="2240896915"/>
+      </p:ext>
+    </p:extLst>
+  </p:cSld>
+  <p:clrMapOvr>
+    <a:masterClrMapping/>
+  </p:clrMapOvr>
+</p:sld>
+</file>
+
 <file path=ppt/slides/slide2.xml><?xml version="1.0" encoding="utf-8"?>
 <p:sld xmlns:a="http://schemas.openxmlformats.org/drawingml/2006/main" xmlns:r="http://schemas.openxmlformats.org/officeDocument/2006/relationships" xmlns:p="http://schemas.openxmlformats.org/presentationml/2006/main">
   <p:cSld>
@@ -12965,17 +13819,7 @@
                   </a:schemeClr>
                 </a:solidFill>
               </a:rPr>
-              <a:t>17.7±</a:t>
-            </a:r>
-            <a:r>
-              <a:rPr lang="fr-FR" sz="1050" dirty="0" smtClean="0">
-                <a:solidFill>
-                  <a:schemeClr val="accent4">
-                    <a:lumMod val="75000"/>
-                  </a:schemeClr>
-                </a:solidFill>
-              </a:rPr>
-              <a:t>2.0</a:t>
+              <a:t>17.7±2.0</a:t>
             </a:r>
             <a:endParaRPr lang="en-GB" sz="1050" dirty="0">
               <a:solidFill>
@@ -13015,15 +13859,7 @@
                   <a:schemeClr val="accent2"/>
                 </a:solidFill>
               </a:rPr>
-              <a:t>22.4±</a:t>
-            </a:r>
-            <a:r>
-              <a:rPr lang="fr-FR" sz="1050" dirty="0" smtClean="0">
-                <a:solidFill>
-                  <a:schemeClr val="accent2"/>
-                </a:solidFill>
-              </a:rPr>
-              <a:t>1.0</a:t>
+              <a:t>22.4±1.0</a:t>
             </a:r>
             <a:endParaRPr lang="en-GB" sz="1050" dirty="0">
               <a:solidFill>
@@ -13063,17 +13899,7 @@
                   </a:schemeClr>
                 </a:solidFill>
               </a:rPr>
-              <a:t>22.8±</a:t>
-            </a:r>
-            <a:r>
-              <a:rPr lang="fr-FR" sz="1050" dirty="0" smtClean="0">
-                <a:solidFill>
-                  <a:schemeClr val="accent4">
-                    <a:lumMod val="75000"/>
-                  </a:schemeClr>
-                </a:solidFill>
-              </a:rPr>
-              <a:t>1.8</a:t>
+              <a:t>22.8±1.8</a:t>
             </a:r>
             <a:endParaRPr lang="en-GB" sz="1050" dirty="0">
               <a:solidFill>
@@ -15223,7 +16049,7 @@
   <a:extraClrSchemeLst/>
   <a:extLst>
     <a:ext uri="{05A4C25C-085E-4340-85A3-A5531E510DB2}">
-      <thm15:themeFamily xmlns:thm15="http://schemas.microsoft.com/office/thememl/2012/main" xmlns="" name="Template PP CEA 4-3.pptx" id="{017B0BBD-D478-416D-9408-C3E5553B88B8}" vid="{9A88B8C1-4942-46D3-9391-C2B501F07E87}"/>
+      <thm15:themeFamily xmlns="" xmlns:thm15="http://schemas.microsoft.com/office/thememl/2012/main" name="Template PP CEA 4-3.pptx" id="{017B0BBD-D478-416D-9408-C3E5553B88B8}" vid="{9A88B8C1-4942-46D3-9391-C2B501F07E87}"/>
     </a:ext>
   </a:extLst>
 </a:theme>
@@ -15438,7 +16264,7 @@
   <a:extraClrSchemeLst/>
   <a:extLst>
     <a:ext uri="{05A4C25C-085E-4340-85A3-A5531E510DB2}">
-      <thm15:themeFamily xmlns:thm15="http://schemas.microsoft.com/office/thememl/2012/main" xmlns="" name="Template PP CEA 4-3.pptx" id="{017B0BBD-D478-416D-9408-C3E5553B88B8}" vid="{52A1E219-64F3-4477-912D-9636D70C98A7}"/>
+      <thm15:themeFamily xmlns="" xmlns:thm15="http://schemas.microsoft.com/office/thememl/2012/main" name="Template PP CEA 4-3.pptx" id="{017B0BBD-D478-416D-9408-C3E5553B88B8}" vid="{52A1E219-64F3-4477-912D-9636D70C98A7}"/>
     </a:ext>
   </a:extLst>
 </a:theme>
@@ -15653,7 +16479,7 @@
   <a:extraClrSchemeLst/>
   <a:extLst>
     <a:ext uri="{05A4C25C-085E-4340-85A3-A5531E510DB2}">
-      <thm15:themeFamily xmlns:thm15="http://schemas.microsoft.com/office/thememl/2012/main" xmlns="" name="Template PP CEA 4-3.pptx" id="{017B0BBD-D478-416D-9408-C3E5553B88B8}" vid="{0799EC0F-9A1D-48A9-9692-520D5CEBB494}"/>
+      <thm15:themeFamily xmlns="" xmlns:thm15="http://schemas.microsoft.com/office/thememl/2012/main" name="Template PP CEA 4-3.pptx" id="{017B0BBD-D478-416D-9408-C3E5553B88B8}" vid="{0799EC0F-9A1D-48A9-9692-520D5CEBB494}"/>
     </a:ext>
   </a:extLst>
 </a:theme>
@@ -15948,7 +16774,7 @@
   <a:extraClrSchemeLst/>
   <a:extLst>
     <a:ext uri="{05A4C25C-085E-4340-85A3-A5531E510DB2}">
-      <thm15:themeFamily xmlns:thm15="http://schemas.microsoft.com/office/thememl/2012/main" xmlns="" name="Office Theme" id="{62F939B6-93AF-4DB8-9C6B-D6C7DFDC589F}" vid="{4A3C46E8-61CC-4603-A589-7422A47A8E4A}"/>
+      <thm15:themeFamily xmlns="" xmlns:thm15="http://schemas.microsoft.com/office/thememl/2012/main" name="Office Theme" id="{62F939B6-93AF-4DB8-9C6B-D6C7DFDC589F}" vid="{4A3C46E8-61CC-4603-A589-7422A47A8E4A}"/>
     </a:ext>
   </a:extLst>
 </a:theme>
@@ -16243,28 +17069,13 @@
   <a:extraClrSchemeLst/>
   <a:extLst>
     <a:ext uri="{05A4C25C-085E-4340-85A3-A5531E510DB2}">
-      <thm15:themeFamily xmlns:thm15="http://schemas.microsoft.com/office/thememl/2012/main" xmlns="" name="Office Theme" id="{62F939B6-93AF-4DB8-9C6B-D6C7DFDC589F}" vid="{4A3C46E8-61CC-4603-A589-7422A47A8E4A}"/>
+      <thm15:themeFamily xmlns="" xmlns:thm15="http://schemas.microsoft.com/office/thememl/2012/main" name="Office Theme" id="{62F939B6-93AF-4DB8-9C6B-D6C7DFDC589F}" vid="{4A3C46E8-61CC-4603-A589-7422A47A8E4A}"/>
     </a:ext>
   </a:extLst>
 </a:theme>
 </file>
 
 <file path=customXml/item1.xml><?xml version="1.0" encoding="utf-8"?>
-<p:properties xmlns:p="http://schemas.microsoft.com/office/2006/metadata/properties" xmlns:xsi="http://www.w3.org/2001/XMLSchema-instance" xmlns:pc="http://schemas.microsoft.com/office/infopath/2007/PartnerControls">
-  <documentManagement/>
-</p:properties>
-</file>
-
-<file path=customXml/item2.xml><?xml version="1.0" encoding="utf-8"?>
-<?mso-contentType ?>
-<FormTemplates xmlns="http://schemas.microsoft.com/sharepoint/v3/contenttype/forms">
-  <Display>DocumentLibraryForm</Display>
-  <Edit>DocumentLibraryForm</Edit>
-  <New>DocumentLibraryForm</New>
-</FormTemplates>
-</file>
-
-<file path=customXml/item3.xml><?xml version="1.0" encoding="utf-8"?>
 <ct:contentTypeSchema xmlns:ct="http://schemas.microsoft.com/office/2006/metadata/contentType" xmlns:ma="http://schemas.microsoft.com/office/2006/metadata/properties/metaAttributes" ct:_="" ma:_="" ma:contentTypeName="Document" ma:contentTypeID="0x010100362F2A79C4BED747976EC3AD530384C1" ma:contentTypeVersion="0" ma:contentTypeDescription="Crée un document." ma:contentTypeScope="" ma:versionID="9ea4ffbb61354172aceb879db3e26537">
   <xsd:schema xmlns:xsd="http://www.w3.org/2001/XMLSchema" xmlns:xs="http://www.w3.org/2001/XMLSchema" xmlns:p="http://schemas.microsoft.com/office/2006/metadata/properties" targetNamespace="http://schemas.microsoft.com/office/2006/metadata/properties" ma:root="true" ma:fieldsID="ab09c1ba23edfaa45a5e9d385267c9b5">
     <xsd:element name="properties">
@@ -16378,17 +17189,33 @@
 </ct:contentTypeSchema>
 </file>
 
+<file path=customXml/item2.xml><?xml version="1.0" encoding="utf-8"?>
+<?mso-contentType ?>
+<FormTemplates xmlns="http://schemas.microsoft.com/sharepoint/v3/contenttype/forms">
+  <Display>DocumentLibraryForm</Display>
+  <Edit>DocumentLibraryForm</Edit>
+  <New>DocumentLibraryForm</New>
+</FormTemplates>
+</file>
+
+<file path=customXml/item3.xml><?xml version="1.0" encoding="utf-8"?>
+<p:properties xmlns:p="http://schemas.microsoft.com/office/2006/metadata/properties" xmlns:xsi="http://www.w3.org/2001/XMLSchema-instance" xmlns:pc="http://schemas.microsoft.com/office/infopath/2007/PartnerControls">
+  <documentManagement/>
+</p:properties>
+</file>
+
 <file path=customXml/itemProps1.xml><?xml version="1.0" encoding="utf-8"?>
-<ds:datastoreItem xmlns:ds="http://schemas.openxmlformats.org/officeDocument/2006/customXml" ds:itemID="{C4B0D5B4-4CC6-4497-9BFB-91C4C64EBEC9}">
+<ds:datastoreItem xmlns:ds="http://schemas.openxmlformats.org/officeDocument/2006/customXml" ds:itemID="{866C4233-EA21-4292-B391-09F7550CF5BF}">
   <ds:schemaRefs>
+    <ds:schemaRef ds:uri="http://schemas.microsoft.com/office/2006/metadata/contentType"/>
+    <ds:schemaRef ds:uri="http://schemas.microsoft.com/office/2006/metadata/properties/metaAttributes"/>
+    <ds:schemaRef ds:uri="http://www.w3.org/2001/XMLSchema"/>
+    <ds:schemaRef ds:uri="http://schemas.microsoft.com/office/2006/metadata/properties"/>
+    <ds:schemaRef ds:uri="http://schemas.openxmlformats.org/package/2006/metadata/core-properties"/>
     <ds:schemaRef ds:uri="http://purl.org/dc/elements/1.1/"/>
-    <ds:schemaRef ds:uri="http://schemas.microsoft.com/office/2006/metadata/properties"/>
-    <ds:schemaRef ds:uri="http://purl.org/dc/dcmitype/"/>
     <ds:schemaRef ds:uri="http://purl.org/dc/terms/"/>
-    <ds:schemaRef ds:uri="http://schemas.microsoft.com/office/2006/documentManagement/types"/>
+    <ds:schemaRef ds:uri="http://schemas.microsoft.com/internal/obd"/>
     <ds:schemaRef ds:uri="http://schemas.microsoft.com/office/infopath/2007/PartnerControls"/>
-    <ds:schemaRef ds:uri="http://schemas.openxmlformats.org/package/2006/metadata/core-properties"/>
-    <ds:schemaRef ds:uri="http://www.w3.org/XML/1998/namespace"/>
   </ds:schemaRefs>
 </ds:datastoreItem>
 </file>
@@ -16402,17 +17229,16 @@
 </file>
 
 <file path=customXml/itemProps3.xml><?xml version="1.0" encoding="utf-8"?>
-<ds:datastoreItem xmlns:ds="http://schemas.openxmlformats.org/officeDocument/2006/customXml" ds:itemID="{866C4233-EA21-4292-B391-09F7550CF5BF}">
+<ds:datastoreItem xmlns:ds="http://schemas.openxmlformats.org/officeDocument/2006/customXml" ds:itemID="{C4B0D5B4-4CC6-4497-9BFB-91C4C64EBEC9}">
   <ds:schemaRefs>
-    <ds:schemaRef ds:uri="http://schemas.microsoft.com/office/2006/metadata/contentType"/>
-    <ds:schemaRef ds:uri="http://schemas.microsoft.com/office/2006/metadata/properties/metaAttributes"/>
-    <ds:schemaRef ds:uri="http://www.w3.org/2001/XMLSchema"/>
     <ds:schemaRef ds:uri="http://schemas.microsoft.com/office/2006/metadata/properties"/>
+    <ds:schemaRef ds:uri="http://purl.org/dc/elements/1.1/"/>
+    <ds:schemaRef ds:uri="http://schemas.microsoft.com/office/infopath/2007/PartnerControls"/>
+    <ds:schemaRef ds:uri="http://schemas.microsoft.com/office/2006/documentManagement/types"/>
+    <ds:schemaRef ds:uri="http://purl.org/dc/terms/"/>
     <ds:schemaRef ds:uri="http://schemas.openxmlformats.org/package/2006/metadata/core-properties"/>
-    <ds:schemaRef ds:uri="http://purl.org/dc/elements/1.1/"/>
-    <ds:schemaRef ds:uri="http://purl.org/dc/terms/"/>
-    <ds:schemaRef ds:uri="http://schemas.microsoft.com/internal/obd"/>
-    <ds:schemaRef ds:uri="http://schemas.microsoft.com/office/infopath/2007/PartnerControls"/>
+    <ds:schemaRef ds:uri="http://www.w3.org/XML/1998/namespace"/>
+    <ds:schemaRef ds:uri="http://purl.org/dc/dcmitype/"/>
   </ds:schemaRefs>
 </ds:datastoreItem>
 </file>
</xml_diff>